<commit_message>
added lecture 2 slides and some other changes
</commit_message>
<xml_diff>
--- a/lecture_02/Modules and Applications.pptx
+++ b/lecture_02/Modules and Applications.pptx
@@ -287,7 +287,7 @@
           <a:p>
             <a:fld id="{DD7909B4-0034-084A-82BA-DE59354427DE}" type="datetime1">
               <a:rPr lang="en-US" smtClean="0"/>
-              <a:t>12/31/19</a:t>
+              <a:t>1/1/20</a:t>
             </a:fld>
             <a:endParaRPr lang="en-US"/>
           </a:p>
@@ -453,7 +453,7 @@
           <a:p>
             <a:fld id="{9BAEE3B6-A6CF-1B42-910E-8E290E739F0F}" type="datetime1">
               <a:rPr lang="en-US" smtClean="0"/>
-              <a:t>12/31/19</a:t>
+              <a:t>1/1/20</a:t>
             </a:fld>
             <a:endParaRPr lang="en-US"/>
           </a:p>
@@ -24434,7 +24434,23 @@
                 <a:ea typeface="Verdana" panose="020B0604030504040204" pitchFamily="34" charset="0"/>
                 <a:cs typeface="Verdana" panose="020B0604030504040204" pitchFamily="34" charset="0"/>
               </a:rPr>
-              <a:t>If we surround it all but one try catch, the same thing happens but let’s put another </a:t>
+              <a:t>If we surround it </a:t>
+            </a:r>
+            <a:r>
+              <a:rPr lang="en-US" sz="1800">
+                <a:latin typeface="Verdana" panose="020B0604030504040204" pitchFamily="34" charset="0"/>
+                <a:ea typeface="Verdana" panose="020B0604030504040204" pitchFamily="34" charset="0"/>
+                <a:cs typeface="Verdana" panose="020B0604030504040204" pitchFamily="34" charset="0"/>
+              </a:rPr>
+              <a:t>all with </a:t>
+            </a:r>
+            <a:r>
+              <a:rPr lang="en-US" sz="1800" dirty="0">
+                <a:latin typeface="Verdana" panose="020B0604030504040204" pitchFamily="34" charset="0"/>
+                <a:ea typeface="Verdana" panose="020B0604030504040204" pitchFamily="34" charset="0"/>
+                <a:cs typeface="Verdana" panose="020B0604030504040204" pitchFamily="34" charset="0"/>
+              </a:rPr>
+              <a:t>one try catch, the same thing happens but let’s put another </a:t>
             </a:r>
             <a:r>
               <a:rPr lang="en-US" sz="1800" b="1" i="1" dirty="0" err="1">

</xml_diff>